<commit_message>
post bookmark bug fix
</commit_message>
<xml_diff>
--- a/bioinf_project/static/images/pics.pptx
+++ b/bioinf_project/static/images/pics.pptx
@@ -298,7 +298,7 @@
             <a:fld id="{530820CF-B880-4189-942D-D702A7CBA730}" type="datetimeFigureOut">
               <a:rPr lang="zh-CN" altLang="en-US" smtClean="0"/>
               <a:pPr/>
-              <a:t>2015/2/12</a:t>
+              <a:t>2015/4/3</a:t>
             </a:fld>
             <a:endParaRPr lang="zh-CN" altLang="en-US"/>
           </a:p>
@@ -465,7 +465,7 @@
             <a:fld id="{530820CF-B880-4189-942D-D702A7CBA730}" type="datetimeFigureOut">
               <a:rPr lang="zh-CN" altLang="en-US" smtClean="0"/>
               <a:pPr/>
-              <a:t>2015/2/12</a:t>
+              <a:t>2015/4/3</a:t>
             </a:fld>
             <a:endParaRPr lang="zh-CN" altLang="en-US"/>
           </a:p>
@@ -642,7 +642,7 @@
             <a:fld id="{530820CF-B880-4189-942D-D702A7CBA730}" type="datetimeFigureOut">
               <a:rPr lang="zh-CN" altLang="en-US" smtClean="0"/>
               <a:pPr/>
-              <a:t>2015/2/12</a:t>
+              <a:t>2015/4/3</a:t>
             </a:fld>
             <a:endParaRPr lang="zh-CN" altLang="en-US"/>
           </a:p>
@@ -809,7 +809,7 @@
             <a:fld id="{530820CF-B880-4189-942D-D702A7CBA730}" type="datetimeFigureOut">
               <a:rPr lang="zh-CN" altLang="en-US" smtClean="0"/>
               <a:pPr/>
-              <a:t>2015/2/12</a:t>
+              <a:t>2015/4/3</a:t>
             </a:fld>
             <a:endParaRPr lang="zh-CN" altLang="en-US"/>
           </a:p>
@@ -1052,7 +1052,7 @@
             <a:fld id="{530820CF-B880-4189-942D-D702A7CBA730}" type="datetimeFigureOut">
               <a:rPr lang="zh-CN" altLang="en-US" smtClean="0"/>
               <a:pPr/>
-              <a:t>2015/2/12</a:t>
+              <a:t>2015/4/3</a:t>
             </a:fld>
             <a:endParaRPr lang="zh-CN" altLang="en-US"/>
           </a:p>
@@ -1337,7 +1337,7 @@
             <a:fld id="{530820CF-B880-4189-942D-D702A7CBA730}" type="datetimeFigureOut">
               <a:rPr lang="zh-CN" altLang="en-US" smtClean="0"/>
               <a:pPr/>
-              <a:t>2015/2/12</a:t>
+              <a:t>2015/4/3</a:t>
             </a:fld>
             <a:endParaRPr lang="zh-CN" altLang="en-US"/>
           </a:p>
@@ -1756,7 +1756,7 @@
             <a:fld id="{530820CF-B880-4189-942D-D702A7CBA730}" type="datetimeFigureOut">
               <a:rPr lang="zh-CN" altLang="en-US" smtClean="0"/>
               <a:pPr/>
-              <a:t>2015/2/12</a:t>
+              <a:t>2015/4/3</a:t>
             </a:fld>
             <a:endParaRPr lang="zh-CN" altLang="en-US"/>
           </a:p>
@@ -1871,7 +1871,7 @@
             <a:fld id="{530820CF-B880-4189-942D-D702A7CBA730}" type="datetimeFigureOut">
               <a:rPr lang="zh-CN" altLang="en-US" smtClean="0"/>
               <a:pPr/>
-              <a:t>2015/2/12</a:t>
+              <a:t>2015/4/3</a:t>
             </a:fld>
             <a:endParaRPr lang="zh-CN" altLang="en-US"/>
           </a:p>
@@ -1963,7 +1963,7 @@
             <a:fld id="{530820CF-B880-4189-942D-D702A7CBA730}" type="datetimeFigureOut">
               <a:rPr lang="zh-CN" altLang="en-US" smtClean="0"/>
               <a:pPr/>
-              <a:t>2015/2/12</a:t>
+              <a:t>2015/4/3</a:t>
             </a:fld>
             <a:endParaRPr lang="zh-CN" altLang="en-US"/>
           </a:p>
@@ -2237,7 +2237,7 @@
             <a:fld id="{530820CF-B880-4189-942D-D702A7CBA730}" type="datetimeFigureOut">
               <a:rPr lang="zh-CN" altLang="en-US" smtClean="0"/>
               <a:pPr/>
-              <a:t>2015/2/12</a:t>
+              <a:t>2015/4/3</a:t>
             </a:fld>
             <a:endParaRPr lang="zh-CN" altLang="en-US"/>
           </a:p>
@@ -2487,7 +2487,7 @@
             <a:fld id="{530820CF-B880-4189-942D-D702A7CBA730}" type="datetimeFigureOut">
               <a:rPr lang="zh-CN" altLang="en-US" smtClean="0"/>
               <a:pPr/>
-              <a:t>2015/2/12</a:t>
+              <a:t>2015/4/3</a:t>
             </a:fld>
             <a:endParaRPr lang="zh-CN" altLang="en-US"/>
           </a:p>
@@ -2697,7 +2697,7 @@
             <a:fld id="{530820CF-B880-4189-942D-D702A7CBA730}" type="datetimeFigureOut">
               <a:rPr lang="zh-CN" altLang="en-US" smtClean="0"/>
               <a:pPr/>
-              <a:t>2015/2/12</a:t>
+              <a:t>2015/4/3</a:t>
             </a:fld>
             <a:endParaRPr lang="zh-CN" altLang="en-US"/>
           </a:p>
@@ -3219,29 +3219,325 @@
           <a:bodyPr/>
           <a:lstStyle/>
           <a:p>
-            <a:endParaRPr lang="en-US"/>
-          </a:p>
-        </p:txBody>
-      </p:sp>
-      <p:sp>
-        <p:nvSpPr>
-          <p:cNvPr id="3" name="Content Placeholder 2"/>
-          <p:cNvSpPr>
-            <a:spLocks noGrp="1"/>
-          </p:cNvSpPr>
-          <p:nvPr>
-            <p:ph idx="1"/>
-          </p:nvPr>
-        </p:nvSpPr>
-        <p:spPr/>
-        <p:txBody>
-          <a:bodyPr/>
-          <a:lstStyle/>
-          <a:p>
-            <a:endParaRPr lang="en-US"/>
-          </a:p>
-        </p:txBody>
-      </p:sp>
+            <a:r>
+              <a:rPr lang="en-US" dirty="0" smtClean="0"/>
+              <a:t>Enrichment testing</a:t>
+            </a:r>
+            <a:endParaRPr lang="en-US" dirty="0"/>
+          </a:p>
+        </p:txBody>
+      </p:sp>
+      <p:grpSp>
+        <p:nvGrpSpPr>
+          <p:cNvPr id="25" name="Group 24"/>
+          <p:cNvGrpSpPr/>
+          <p:nvPr/>
+        </p:nvGrpSpPr>
+        <p:grpSpPr>
+          <a:xfrm>
+            <a:off x="3505304" y="2996952"/>
+            <a:ext cx="1187600" cy="1179415"/>
+            <a:chOff x="3505304" y="2996952"/>
+            <a:chExt cx="1187600" cy="1179415"/>
+          </a:xfrm>
+        </p:grpSpPr>
+        <p:sp>
+          <p:nvSpPr>
+            <p:cNvPr id="4" name="Oval 3"/>
+            <p:cNvSpPr/>
+            <p:nvPr/>
+          </p:nvSpPr>
+          <p:spPr>
+            <a:xfrm>
+              <a:off x="3563888" y="2996952"/>
+              <a:ext cx="251366" cy="251366"/>
+            </a:xfrm>
+            <a:prstGeom prst="ellipse">
+              <a:avLst/>
+            </a:prstGeom>
+          </p:spPr>
+          <p:style>
+            <a:lnRef idx="2">
+              <a:schemeClr val="accent2">
+                <a:shade val="50000"/>
+              </a:schemeClr>
+            </a:lnRef>
+            <a:fillRef idx="1">
+              <a:schemeClr val="accent2"/>
+            </a:fillRef>
+            <a:effectRef idx="0">
+              <a:schemeClr val="accent2"/>
+            </a:effectRef>
+            <a:fontRef idx="minor">
+              <a:schemeClr val="lt1"/>
+            </a:fontRef>
+          </p:style>
+          <p:txBody>
+            <a:bodyPr rtlCol="0" anchor="ctr"/>
+            <a:lstStyle/>
+            <a:p>
+              <a:pPr algn="ctr"/>
+              <a:endParaRPr lang="en-US"/>
+            </a:p>
+          </p:txBody>
+        </p:sp>
+        <p:sp>
+          <p:nvSpPr>
+            <p:cNvPr id="5" name="Oval 4"/>
+            <p:cNvSpPr/>
+            <p:nvPr/>
+          </p:nvSpPr>
+          <p:spPr>
+            <a:xfrm>
+              <a:off x="4343855" y="3873616"/>
+              <a:ext cx="302751" cy="302751"/>
+            </a:xfrm>
+            <a:prstGeom prst="ellipse">
+              <a:avLst/>
+            </a:prstGeom>
+          </p:spPr>
+          <p:style>
+            <a:lnRef idx="2">
+              <a:schemeClr val="accent2">
+                <a:shade val="50000"/>
+              </a:schemeClr>
+            </a:lnRef>
+            <a:fillRef idx="1">
+              <a:schemeClr val="accent2"/>
+            </a:fillRef>
+            <a:effectRef idx="0">
+              <a:schemeClr val="accent2"/>
+            </a:effectRef>
+            <a:fontRef idx="minor">
+              <a:schemeClr val="lt1"/>
+            </a:fontRef>
+          </p:style>
+          <p:txBody>
+            <a:bodyPr rtlCol="0" anchor="ctr"/>
+            <a:lstStyle/>
+            <a:p>
+              <a:pPr algn="ctr"/>
+              <a:endParaRPr lang="en-US"/>
+            </a:p>
+          </p:txBody>
+        </p:sp>
+        <p:sp>
+          <p:nvSpPr>
+            <p:cNvPr id="6" name="Oval 5"/>
+            <p:cNvSpPr/>
+            <p:nvPr/>
+          </p:nvSpPr>
+          <p:spPr>
+            <a:xfrm>
+              <a:off x="3505304" y="3739413"/>
+              <a:ext cx="346615" cy="346615"/>
+            </a:xfrm>
+            <a:prstGeom prst="ellipse">
+              <a:avLst/>
+            </a:prstGeom>
+          </p:spPr>
+          <p:style>
+            <a:lnRef idx="2">
+              <a:schemeClr val="accent2">
+                <a:shade val="50000"/>
+              </a:schemeClr>
+            </a:lnRef>
+            <a:fillRef idx="1">
+              <a:schemeClr val="accent2"/>
+            </a:fillRef>
+            <a:effectRef idx="0">
+              <a:schemeClr val="accent2"/>
+            </a:effectRef>
+            <a:fontRef idx="minor">
+              <a:schemeClr val="lt1"/>
+            </a:fontRef>
+          </p:style>
+          <p:txBody>
+            <a:bodyPr rtlCol="0" anchor="ctr"/>
+            <a:lstStyle/>
+            <a:p>
+              <a:pPr algn="ctr"/>
+              <a:endParaRPr lang="en-US"/>
+            </a:p>
+          </p:txBody>
+        </p:sp>
+        <p:sp>
+          <p:nvSpPr>
+            <p:cNvPr id="7" name="Oval 6"/>
+            <p:cNvSpPr/>
+            <p:nvPr/>
+          </p:nvSpPr>
+          <p:spPr>
+            <a:xfrm>
+              <a:off x="4283968" y="3026688"/>
+              <a:ext cx="408936" cy="408936"/>
+            </a:xfrm>
+            <a:prstGeom prst="ellipse">
+              <a:avLst/>
+            </a:prstGeom>
+          </p:spPr>
+          <p:style>
+            <a:lnRef idx="2">
+              <a:schemeClr val="accent2">
+                <a:shade val="50000"/>
+              </a:schemeClr>
+            </a:lnRef>
+            <a:fillRef idx="1">
+              <a:schemeClr val="accent2"/>
+            </a:fillRef>
+            <a:effectRef idx="0">
+              <a:schemeClr val="accent2"/>
+            </a:effectRef>
+            <a:fontRef idx="minor">
+              <a:schemeClr val="lt1"/>
+            </a:fontRef>
+          </p:style>
+          <p:txBody>
+            <a:bodyPr rtlCol="0" anchor="ctr"/>
+            <a:lstStyle/>
+            <a:p>
+              <a:pPr algn="ctr"/>
+              <a:endParaRPr lang="en-US"/>
+            </a:p>
+          </p:txBody>
+        </p:sp>
+        <p:cxnSp>
+          <p:nvCxnSpPr>
+            <p:cNvPr id="9" name="Straight Connector 8"/>
+            <p:cNvCxnSpPr>
+              <a:stCxn id="7" idx="4"/>
+              <a:endCxn id="5" idx="0"/>
+            </p:cNvCxnSpPr>
+            <p:nvPr/>
+          </p:nvCxnSpPr>
+          <p:spPr>
+            <a:xfrm>
+              <a:off x="4488436" y="3435624"/>
+              <a:ext cx="6795" cy="437992"/>
+            </a:xfrm>
+            <a:prstGeom prst="line">
+              <a:avLst/>
+            </a:prstGeom>
+            <a:ln w="38100"/>
+          </p:spPr>
+          <p:style>
+            <a:lnRef idx="1">
+              <a:schemeClr val="accent1"/>
+            </a:lnRef>
+            <a:fillRef idx="0">
+              <a:schemeClr val="accent1"/>
+            </a:fillRef>
+            <a:effectRef idx="0">
+              <a:schemeClr val="accent1"/>
+            </a:effectRef>
+            <a:fontRef idx="minor">
+              <a:schemeClr val="tx1"/>
+            </a:fontRef>
+          </p:style>
+        </p:cxnSp>
+        <p:cxnSp>
+          <p:nvCxnSpPr>
+            <p:cNvPr id="11" name="Straight Connector 10"/>
+            <p:cNvCxnSpPr>
+              <a:stCxn id="5" idx="2"/>
+              <a:endCxn id="6" idx="6"/>
+            </p:cNvCxnSpPr>
+            <p:nvPr/>
+          </p:nvCxnSpPr>
+          <p:spPr>
+            <a:xfrm flipH="1" flipV="1">
+              <a:off x="3851919" y="3912721"/>
+              <a:ext cx="491936" cy="112271"/>
+            </a:xfrm>
+            <a:prstGeom prst="line">
+              <a:avLst/>
+            </a:prstGeom>
+            <a:ln w="38100"/>
+          </p:spPr>
+          <p:style>
+            <a:lnRef idx="1">
+              <a:schemeClr val="accent1"/>
+            </a:lnRef>
+            <a:fillRef idx="0">
+              <a:schemeClr val="accent1"/>
+            </a:fillRef>
+            <a:effectRef idx="0">
+              <a:schemeClr val="accent1"/>
+            </a:effectRef>
+            <a:fontRef idx="minor">
+              <a:schemeClr val="tx1"/>
+            </a:fontRef>
+          </p:style>
+        </p:cxnSp>
+        <p:cxnSp>
+          <p:nvCxnSpPr>
+            <p:cNvPr id="17" name="Straight Connector 16"/>
+            <p:cNvCxnSpPr>
+              <a:stCxn id="4" idx="5"/>
+              <a:endCxn id="5" idx="1"/>
+            </p:cNvCxnSpPr>
+            <p:nvPr/>
+          </p:nvCxnSpPr>
+          <p:spPr>
+            <a:xfrm>
+              <a:off x="3778442" y="3211506"/>
+              <a:ext cx="609750" cy="706447"/>
+            </a:xfrm>
+            <a:prstGeom prst="line">
+              <a:avLst/>
+            </a:prstGeom>
+            <a:ln w="38100"/>
+          </p:spPr>
+          <p:style>
+            <a:lnRef idx="1">
+              <a:schemeClr val="accent1"/>
+            </a:lnRef>
+            <a:fillRef idx="0">
+              <a:schemeClr val="accent1"/>
+            </a:fillRef>
+            <a:effectRef idx="0">
+              <a:schemeClr val="accent1"/>
+            </a:effectRef>
+            <a:fontRef idx="minor">
+              <a:schemeClr val="tx1"/>
+            </a:fontRef>
+          </p:style>
+        </p:cxnSp>
+        <p:cxnSp>
+          <p:nvCxnSpPr>
+            <p:cNvPr id="22" name="Straight Connector 21"/>
+            <p:cNvCxnSpPr>
+              <a:stCxn id="4" idx="6"/>
+              <a:endCxn id="7" idx="2"/>
+            </p:cNvCxnSpPr>
+            <p:nvPr/>
+          </p:nvCxnSpPr>
+          <p:spPr>
+            <a:xfrm>
+              <a:off x="3815254" y="3122635"/>
+              <a:ext cx="468714" cy="108521"/>
+            </a:xfrm>
+            <a:prstGeom prst="line">
+              <a:avLst/>
+            </a:prstGeom>
+            <a:ln w="38100"/>
+          </p:spPr>
+          <p:style>
+            <a:lnRef idx="1">
+              <a:schemeClr val="accent1"/>
+            </a:lnRef>
+            <a:fillRef idx="0">
+              <a:schemeClr val="accent1"/>
+            </a:fillRef>
+            <a:effectRef idx="0">
+              <a:schemeClr val="accent1"/>
+            </a:effectRef>
+            <a:fontRef idx="minor">
+              <a:schemeClr val="tx1"/>
+            </a:fontRef>
+          </p:style>
+        </p:cxnSp>
+      </p:grpSp>
     </p:spTree>
     <p:extLst>
       <p:ext uri="{BB962C8B-B14F-4D97-AF65-F5344CB8AC3E}">

</xml_diff>